<commit_message>
fix typo on last slide
</commit_message>
<xml_diff>
--- a/intro_to_brms.pptx
+++ b/intro_to_brms.pptx
@@ -243,7 +243,7 @@
           <a:p>
             <a:fld id="{23B88268-2E67-48A3-82C0-FDDAC97966ED}" type="datetimeFigureOut">
               <a:rPr lang="en-US" smtClean="0"/>
-              <a:t>6/10/2019</a:t>
+              <a:t>11-Jun-19</a:t>
             </a:fld>
             <a:endParaRPr lang="en-US"/>
           </a:p>
@@ -742,7 +742,7 @@
           <a:p>
             <a:fld id="{CA2C1D64-8603-4654-9C66-AA8C50C45F72}" type="datetimeFigureOut">
               <a:rPr lang="en-US" smtClean="0"/>
-              <a:t>6/10/2019</a:t>
+              <a:t>11-Jun-19</a:t>
             </a:fld>
             <a:endParaRPr lang="en-US"/>
           </a:p>
@@ -940,7 +940,7 @@
           <a:p>
             <a:fld id="{CA2C1D64-8603-4654-9C66-AA8C50C45F72}" type="datetimeFigureOut">
               <a:rPr lang="en-US" smtClean="0"/>
-              <a:t>6/10/2019</a:t>
+              <a:t>11-Jun-19</a:t>
             </a:fld>
             <a:endParaRPr lang="en-US"/>
           </a:p>
@@ -1148,7 +1148,7 @@
           <a:p>
             <a:fld id="{CA2C1D64-8603-4654-9C66-AA8C50C45F72}" type="datetimeFigureOut">
               <a:rPr lang="en-US" smtClean="0"/>
-              <a:t>6/10/2019</a:t>
+              <a:t>11-Jun-19</a:t>
             </a:fld>
             <a:endParaRPr lang="en-US"/>
           </a:p>
@@ -1346,7 +1346,7 @@
           <a:p>
             <a:fld id="{CA2C1D64-8603-4654-9C66-AA8C50C45F72}" type="datetimeFigureOut">
               <a:rPr lang="en-US" smtClean="0"/>
-              <a:t>6/10/2019</a:t>
+              <a:t>11-Jun-19</a:t>
             </a:fld>
             <a:endParaRPr lang="en-US"/>
           </a:p>
@@ -1621,7 +1621,7 @@
           <a:p>
             <a:fld id="{CA2C1D64-8603-4654-9C66-AA8C50C45F72}" type="datetimeFigureOut">
               <a:rPr lang="en-US" smtClean="0"/>
-              <a:t>6/10/2019</a:t>
+              <a:t>11-Jun-19</a:t>
             </a:fld>
             <a:endParaRPr lang="en-US"/>
           </a:p>
@@ -1886,7 +1886,7 @@
           <a:p>
             <a:fld id="{CA2C1D64-8603-4654-9C66-AA8C50C45F72}" type="datetimeFigureOut">
               <a:rPr lang="en-US" smtClean="0"/>
-              <a:t>6/10/2019</a:t>
+              <a:t>11-Jun-19</a:t>
             </a:fld>
             <a:endParaRPr lang="en-US"/>
           </a:p>
@@ -2298,7 +2298,7 @@
           <a:p>
             <a:fld id="{CA2C1D64-8603-4654-9C66-AA8C50C45F72}" type="datetimeFigureOut">
               <a:rPr lang="en-US" smtClean="0"/>
-              <a:t>6/10/2019</a:t>
+              <a:t>11-Jun-19</a:t>
             </a:fld>
             <a:endParaRPr lang="en-US"/>
           </a:p>
@@ -2439,7 +2439,7 @@
           <a:p>
             <a:fld id="{CA2C1D64-8603-4654-9C66-AA8C50C45F72}" type="datetimeFigureOut">
               <a:rPr lang="en-US" smtClean="0"/>
-              <a:t>6/10/2019</a:t>
+              <a:t>11-Jun-19</a:t>
             </a:fld>
             <a:endParaRPr lang="en-US"/>
           </a:p>
@@ -2552,7 +2552,7 @@
           <a:p>
             <a:fld id="{CA2C1D64-8603-4654-9C66-AA8C50C45F72}" type="datetimeFigureOut">
               <a:rPr lang="en-US" smtClean="0"/>
-              <a:t>6/10/2019</a:t>
+              <a:t>11-Jun-19</a:t>
             </a:fld>
             <a:endParaRPr lang="en-US"/>
           </a:p>
@@ -2863,7 +2863,7 @@
           <a:p>
             <a:fld id="{CA2C1D64-8603-4654-9C66-AA8C50C45F72}" type="datetimeFigureOut">
               <a:rPr lang="en-US" smtClean="0"/>
-              <a:t>6/10/2019</a:t>
+              <a:t>11-Jun-19</a:t>
             </a:fld>
             <a:endParaRPr lang="en-US"/>
           </a:p>
@@ -3151,7 +3151,7 @@
           <a:p>
             <a:fld id="{CA2C1D64-8603-4654-9C66-AA8C50C45F72}" type="datetimeFigureOut">
               <a:rPr lang="en-US" smtClean="0"/>
-              <a:t>6/10/2019</a:t>
+              <a:t>11-Jun-19</a:t>
             </a:fld>
             <a:endParaRPr lang="en-US"/>
           </a:p>
@@ -3392,7 +3392,7 @@
           <a:p>
             <a:fld id="{CA2C1D64-8603-4654-9C66-AA8C50C45F72}" type="datetimeFigureOut">
               <a:rPr lang="en-US" smtClean="0"/>
-              <a:t>6/10/2019</a:t>
+              <a:t>11-Jun-19</a:t>
             </a:fld>
             <a:endParaRPr lang="en-US"/>
           </a:p>
@@ -8811,8 +8811,8 @@
           </a:p>
         </p:txBody>
       </p:sp>
-      <mc:AlternateContent xmlns:mc="http://schemas.openxmlformats.org/markup-compatibility/2006">
-        <mc:Choice xmlns:a14="http://schemas.microsoft.com/office/drawing/2010/main" Requires="a14">
+      <mc:AlternateContent xmlns:mc="http://schemas.openxmlformats.org/markup-compatibility/2006" xmlns:a14="http://schemas.microsoft.com/office/drawing/2010/main">
+        <mc:Choice Requires="a14">
           <p:sp>
             <p:nvSpPr>
               <p:cNvPr id="3" name="Content Placeholder 2">
@@ -8954,7 +8954,7 @@
             </p:txBody>
           </p:sp>
         </mc:Choice>
-        <mc:Fallback>
+        <mc:Fallback xmlns="">
           <p:sp>
             <p:nvSpPr>
               <p:cNvPr id="3" name="Content Placeholder 2">
@@ -20815,7 +20815,7 @@
             </a:r>
             <a:r>
               <a:rPr lang="de-DE" sz="1600" b="1" dirty="0" err="1"/>
-              <a:t>genereally</a:t>
+              <a:t>generally</a:t>
             </a:r>
             <a:r>
               <a:rPr lang="de-DE" sz="1600" b="1" dirty="0"/>
@@ -21369,8 +21369,8 @@
           </a:p>
         </p:txBody>
       </p:sp>
-      <mc:AlternateContent xmlns:mc="http://schemas.openxmlformats.org/markup-compatibility/2006">
-        <mc:Choice xmlns:a14="http://schemas.microsoft.com/office/drawing/2010/main" Requires="a14">
+      <mc:AlternateContent xmlns:mc="http://schemas.openxmlformats.org/markup-compatibility/2006" xmlns:a14="http://schemas.microsoft.com/office/drawing/2010/main">
+        <mc:Choice Requires="a14">
           <p:sp>
             <p:nvSpPr>
               <p:cNvPr id="3" name="Content Placeholder 2">
@@ -21543,7 +21543,7 @@
             </p:txBody>
           </p:sp>
         </mc:Choice>
-        <mc:Fallback>
+        <mc:Fallback xmlns="">
           <p:sp>
             <p:nvSpPr>
               <p:cNvPr id="3" name="Content Placeholder 2">
@@ -23217,8 +23217,8 @@
           </a:p>
         </p:txBody>
       </p:sp>
-      <mc:AlternateContent xmlns:mc="http://schemas.openxmlformats.org/markup-compatibility/2006">
-        <mc:Choice xmlns:a14="http://schemas.microsoft.com/office/drawing/2010/main" Requires="a14">
+      <mc:AlternateContent xmlns:mc="http://schemas.openxmlformats.org/markup-compatibility/2006" xmlns:a14="http://schemas.microsoft.com/office/drawing/2010/main">
+        <mc:Choice Requires="a14">
           <p:sp>
             <p:nvSpPr>
               <p:cNvPr id="3" name="Content Placeholder 2">
@@ -23391,7 +23391,7 @@
             </p:txBody>
           </p:sp>
         </mc:Choice>
-        <mc:Fallback>
+        <mc:Fallback xmlns="">
           <p:sp>
             <p:nvSpPr>
               <p:cNvPr id="3" name="Content Placeholder 2">
@@ -24601,8 +24601,8 @@
           </a:graphicData>
         </a:graphic>
       </p:graphicFrame>
-      <mc:AlternateContent xmlns:mc="http://schemas.openxmlformats.org/markup-compatibility/2006">
-        <mc:Choice xmlns:a14="http://schemas.microsoft.com/office/drawing/2010/main" Requires="a14">
+      <mc:AlternateContent xmlns:mc="http://schemas.openxmlformats.org/markup-compatibility/2006" xmlns:a14="http://schemas.microsoft.com/office/drawing/2010/main">
+        <mc:Choice Requires="a14">
           <p:sp>
             <p:nvSpPr>
               <p:cNvPr id="7" name="Content Placeholder 2">
@@ -24775,7 +24775,7 @@
             </p:txBody>
           </p:sp>
         </mc:Choice>
-        <mc:Fallback>
+        <mc:Fallback xmlns="">
           <p:sp>
             <p:nvSpPr>
               <p:cNvPr id="7" name="Content Placeholder 2">

</xml_diff>